<commit_message>
Add Lab Customization Slide
</commit_message>
<xml_diff>
--- a/Powerpoint/Module01-PreparingForScripting.pptx
+++ b/Powerpoint/Module01-PreparingForScripting.pptx
@@ -14,23 +14,24 @@
     <p:sldId id="260" r:id="rId8"/>
     <p:sldId id="261" r:id="rId9"/>
     <p:sldId id="262" r:id="rId10"/>
-    <p:sldId id="280" r:id="rId11"/>
-    <p:sldId id="281" r:id="rId12"/>
-    <p:sldId id="265" r:id="rId13"/>
-    <p:sldId id="266" r:id="rId14"/>
-    <p:sldId id="267" r:id="rId15"/>
-    <p:sldId id="268" r:id="rId16"/>
-    <p:sldId id="270" r:id="rId17"/>
-    <p:sldId id="269" r:id="rId18"/>
-    <p:sldId id="271" r:id="rId19"/>
-    <p:sldId id="272" r:id="rId20"/>
-    <p:sldId id="273" r:id="rId21"/>
-    <p:sldId id="274" r:id="rId22"/>
-    <p:sldId id="276" r:id="rId23"/>
-    <p:sldId id="275" r:id="rId24"/>
-    <p:sldId id="277" r:id="rId25"/>
-    <p:sldId id="278" r:id="rId26"/>
-    <p:sldId id="279" r:id="rId27"/>
+    <p:sldId id="282" r:id="rId11"/>
+    <p:sldId id="280" r:id="rId12"/>
+    <p:sldId id="281" r:id="rId13"/>
+    <p:sldId id="265" r:id="rId14"/>
+    <p:sldId id="266" r:id="rId15"/>
+    <p:sldId id="267" r:id="rId16"/>
+    <p:sldId id="268" r:id="rId17"/>
+    <p:sldId id="270" r:id="rId18"/>
+    <p:sldId id="269" r:id="rId19"/>
+    <p:sldId id="271" r:id="rId20"/>
+    <p:sldId id="272" r:id="rId21"/>
+    <p:sldId id="273" r:id="rId22"/>
+    <p:sldId id="274" r:id="rId23"/>
+    <p:sldId id="276" r:id="rId24"/>
+    <p:sldId id="275" r:id="rId25"/>
+    <p:sldId id="277" r:id="rId26"/>
+    <p:sldId id="278" r:id="rId27"/>
+    <p:sldId id="279" r:id="rId28"/>
   </p:sldIdLst>
   <p:sldSz cx="9144000" cy="6858000" type="screen4x3"/>
   <p:notesSz cx="6858000" cy="9144000"/>
@@ -5742,6 +5743,133 @@
       </p:grpSpPr>
       <p:sp>
         <p:nvSpPr>
+          <p:cNvPr id="2" name="Title 1">
+            <a:extLst>
+              <a:ext uri="{FF2B5EF4-FFF2-40B4-BE49-F238E27FC236}">
+                <a16:creationId xmlns:a16="http://schemas.microsoft.com/office/drawing/2014/main" id="{EAB9C641-BF34-4508-983C-732901AD8B44}"/>
+              </a:ext>
+            </a:extLst>
+          </p:cNvPr>
+          <p:cNvSpPr>
+            <a:spLocks noGrp="1"/>
+          </p:cNvSpPr>
+          <p:nvPr>
+            <p:ph type="title"/>
+          </p:nvPr>
+        </p:nvSpPr>
+        <p:spPr/>
+        <p:txBody>
+          <a:bodyPr/>
+          <a:lstStyle/>
+          <a:p>
+            <a:r>
+              <a:rPr lang="en-CA" dirty="0"/>
+              <a:t>Byron’s Lab Customizations</a:t>
+            </a:r>
+          </a:p>
+        </p:txBody>
+      </p:sp>
+      <p:sp>
+        <p:nvSpPr>
+          <p:cNvPr id="3" name="Content Placeholder 2">
+            <a:extLst>
+              <a:ext uri="{FF2B5EF4-FFF2-40B4-BE49-F238E27FC236}">
+                <a16:creationId xmlns:a16="http://schemas.microsoft.com/office/drawing/2014/main" id="{0C795689-9D8B-4DFE-8FE4-0E7C20EFB636}"/>
+              </a:ext>
+            </a:extLst>
+          </p:cNvPr>
+          <p:cNvSpPr>
+            <a:spLocks noGrp="1"/>
+          </p:cNvSpPr>
+          <p:nvPr>
+            <p:ph idx="1"/>
+          </p:nvPr>
+        </p:nvSpPr>
+        <p:spPr/>
+        <p:txBody>
+          <a:bodyPr/>
+          <a:lstStyle/>
+          <a:p>
+            <a:r>
+              <a:rPr lang="en-CA" dirty="0"/>
+              <a:t>WARNING: If you “end” the lab, these will reset.</a:t>
+            </a:r>
+          </a:p>
+          <a:p>
+            <a:r>
+              <a:rPr lang="en-CA" dirty="0"/>
+              <a:t>Updated Edge (note: Some things may still need IE because edge is a store app). Could also use Chrome or old Edge.</a:t>
+            </a:r>
+          </a:p>
+          <a:p>
+            <a:r>
+              <a:rPr lang="en-CA" dirty="0"/>
+              <a:t>Downloaded GitHub Desktop for my additional samples</a:t>
+            </a:r>
+          </a:p>
+          <a:p>
+            <a:r>
+              <a:rPr lang="en-CA" dirty="0"/>
+              <a:t>Downloaded Visual Studio Code (Free) </a:t>
+            </a:r>
+          </a:p>
+          <a:p>
+            <a:r>
+              <a:rPr lang="en-CA" dirty="0"/>
+              <a:t>First time opening a PS1 file, prompted to install </a:t>
+            </a:r>
+            <a:r>
+              <a:rPr lang="en-CA" dirty="0" err="1"/>
+              <a:t>Powershell</a:t>
+            </a:r>
+            <a:r>
+              <a:rPr lang="en-CA" dirty="0"/>
+              <a:t> extension</a:t>
+            </a:r>
+          </a:p>
+          <a:p>
+            <a:r>
+              <a:rPr lang="en-CA" dirty="0"/>
+              <a:t>Also installed PS Tools Pro </a:t>
+            </a:r>
+          </a:p>
+          <a:p>
+            <a:endParaRPr lang="en-CA" dirty="0"/>
+          </a:p>
+        </p:txBody>
+      </p:sp>
+    </p:spTree>
+    <p:extLst>
+      <p:ext uri="{BB962C8B-B14F-4D97-AF65-F5344CB8AC3E}">
+        <p14:creationId xmlns:p14="http://schemas.microsoft.com/office/powerpoint/2010/main" val="1281425833"/>
+      </p:ext>
+    </p:extLst>
+  </p:cSld>
+  <p:clrMapOvr>
+    <a:masterClrMapping/>
+  </p:clrMapOvr>
+</p:sld>
+</file>
+
+<file path=ppt/slides/slide11.xml><?xml version="1.0" encoding="utf-8"?>
+<p:sld xmlns:a="http://schemas.openxmlformats.org/drawingml/2006/main" xmlns:r="http://schemas.openxmlformats.org/officeDocument/2006/relationships" xmlns:p="http://schemas.openxmlformats.org/presentationml/2006/main">
+  <p:cSld>
+    <p:spTree>
+      <p:nvGrpSpPr>
+        <p:cNvPr id="1" name=""/>
+        <p:cNvGrpSpPr/>
+        <p:nvPr/>
+      </p:nvGrpSpPr>
+      <p:grpSpPr>
+        <a:xfrm>
+          <a:off x="0" y="0"/>
+          <a:ext cx="0" cy="0"/>
+          <a:chOff x="0" y="0"/>
+          <a:chExt cx="0" cy="0"/>
+        </a:xfrm>
+      </p:grpSpPr>
+      <p:sp>
+        <p:nvSpPr>
           <p:cNvPr id="4" name="Title 3"/>
           <p:cNvSpPr>
             <a:spLocks noGrp="1"/>
@@ -5814,7 +5942,7 @@
 </p:sld>
 </file>
 
-<file path=ppt/slides/slide11.xml><?xml version="1.0" encoding="utf-8"?>
+<file path=ppt/slides/slide12.xml><?xml version="1.0" encoding="utf-8"?>
 <p:sld xmlns:a="http://schemas.openxmlformats.org/drawingml/2006/main" xmlns:r="http://schemas.openxmlformats.org/officeDocument/2006/relationships" xmlns:p="http://schemas.openxmlformats.org/presentationml/2006/main">
   <p:cSld>
     <p:spTree>
@@ -5904,7 +6032,7 @@
 </p:sld>
 </file>
 
-<file path=ppt/slides/slide12.xml><?xml version="1.0" encoding="utf-8"?>
+<file path=ppt/slides/slide13.xml><?xml version="1.0" encoding="utf-8"?>
 <p:sld xmlns:a="http://schemas.openxmlformats.org/drawingml/2006/main" xmlns:r="http://schemas.openxmlformats.org/officeDocument/2006/relationships" xmlns:p="http://schemas.openxmlformats.org/presentationml/2006/main">
   <p:cSld>
     <p:spTree>
@@ -5980,7 +6108,7 @@
 </p:sld>
 </file>
 
-<file path=ppt/slides/slide13.xml><?xml version="1.0" encoding="utf-8"?>
+<file path=ppt/slides/slide14.xml><?xml version="1.0" encoding="utf-8"?>
 <p:sld xmlns:a="http://schemas.openxmlformats.org/drawingml/2006/main" xmlns:r="http://schemas.openxmlformats.org/officeDocument/2006/relationships" xmlns:p="http://schemas.openxmlformats.org/presentationml/2006/main">
   <p:cSld>
     <p:spTree>
@@ -6350,7 +6478,7 @@
 </p:sld>
 </file>
 
-<file path=ppt/slides/slide14.xml><?xml version="1.0" encoding="utf-8"?>
+<file path=ppt/slides/slide15.xml><?xml version="1.0" encoding="utf-8"?>
 <p:sld xmlns:a="http://schemas.openxmlformats.org/drawingml/2006/main" xmlns:r="http://schemas.openxmlformats.org/officeDocument/2006/relationships" xmlns:p="http://schemas.openxmlformats.org/presentationml/2006/main">
   <p:cSld>
     <p:spTree>
@@ -6466,7 +6594,7 @@
 </p:sld>
 </file>
 
-<file path=ppt/slides/slide15.xml><?xml version="1.0" encoding="utf-8"?>
+<file path=ppt/slides/slide16.xml><?xml version="1.0" encoding="utf-8"?>
 <p:sld xmlns:a="http://schemas.openxmlformats.org/drawingml/2006/main" xmlns:r="http://schemas.openxmlformats.org/officeDocument/2006/relationships" xmlns:p="http://schemas.openxmlformats.org/presentationml/2006/main">
   <p:cSld>
     <p:spTree>
@@ -6616,7 +6744,7 @@
 </p:sld>
 </file>
 
-<file path=ppt/slides/slide16.xml><?xml version="1.0" encoding="utf-8"?>
+<file path=ppt/slides/slide17.xml><?xml version="1.0" encoding="utf-8"?>
 <p:sld xmlns:a="http://schemas.openxmlformats.org/drawingml/2006/main" xmlns:r="http://schemas.openxmlformats.org/officeDocument/2006/relationships" xmlns:p="http://schemas.openxmlformats.org/presentationml/2006/main">
   <p:cSld>
     <p:spTree>
@@ -6702,7 +6830,7 @@
 </p:sld>
 </file>
 
-<file path=ppt/slides/slide17.xml><?xml version="1.0" encoding="utf-8"?>
+<file path=ppt/slides/slide18.xml><?xml version="1.0" encoding="utf-8"?>
 <p:sld xmlns:a="http://schemas.openxmlformats.org/drawingml/2006/main" xmlns:r="http://schemas.openxmlformats.org/officeDocument/2006/relationships" xmlns:p="http://schemas.openxmlformats.org/presentationml/2006/main">
   <p:cSld>
     <p:spTree>
@@ -8143,7 +8271,7 @@
 </p:sld>
 </file>
 
-<file path=ppt/slides/slide18.xml><?xml version="1.0" encoding="utf-8"?>
+<file path=ppt/slides/slide19.xml><?xml version="1.0" encoding="utf-8"?>
 <p:sld xmlns:a="http://schemas.openxmlformats.org/drawingml/2006/main" xmlns:r="http://schemas.openxmlformats.org/officeDocument/2006/relationships" xmlns:p="http://schemas.openxmlformats.org/presentationml/2006/main">
   <p:cSld>
     <p:spTree>
@@ -8219,7 +8347,81 @@
 </p:sld>
 </file>
 
-<file path=ppt/slides/slide19.xml><?xml version="1.0" encoding="utf-8"?>
+<file path=ppt/slides/slide2.xml><?xml version="1.0" encoding="utf-8"?>
+<p:sld xmlns:a="http://schemas.openxmlformats.org/drawingml/2006/main" xmlns:r="http://schemas.openxmlformats.org/officeDocument/2006/relationships" xmlns:p="http://schemas.openxmlformats.org/presentationml/2006/main">
+  <p:cSld>
+    <p:spTree>
+      <p:nvGrpSpPr>
+        <p:cNvPr id="1" name=""/>
+        <p:cNvGrpSpPr/>
+        <p:nvPr/>
+      </p:nvGrpSpPr>
+      <p:grpSpPr>
+        <a:xfrm>
+          <a:off x="0" y="0"/>
+          <a:ext cx="0" cy="0"/>
+          <a:chOff x="0" y="0"/>
+          <a:chExt cx="0" cy="0"/>
+        </a:xfrm>
+      </p:grpSpPr>
+      <p:sp>
+        <p:nvSpPr>
+          <p:cNvPr id="4" name="Title 3"/>
+          <p:cNvSpPr>
+            <a:spLocks noGrp="1"/>
+          </p:cNvSpPr>
+          <p:nvPr>
+            <p:ph type="title"/>
+          </p:nvPr>
+        </p:nvSpPr>
+        <p:spPr/>
+        <p:txBody>
+          <a:bodyPr/>
+          <a:lstStyle/>
+          <a:p>
+            <a:r>
+              <a:rPr lang="en-US" dirty="0"/>
+              <a:t>overview</a:t>
+            </a:r>
+          </a:p>
+        </p:txBody>
+      </p:sp>
+      <p:sp>
+        <p:nvSpPr>
+          <p:cNvPr id="5" name="Text Placeholder 4"/>
+          <p:cNvSpPr>
+            <a:spLocks noGrp="1"/>
+          </p:cNvSpPr>
+          <p:nvPr>
+            <p:ph type="body" idx="1"/>
+          </p:nvPr>
+        </p:nvSpPr>
+        <p:spPr/>
+        <p:txBody>
+          <a:bodyPr/>
+          <a:lstStyle/>
+          <a:p>
+            <a:r>
+              <a:rPr lang="en-US" dirty="0"/>
+              <a:t>Lesson 1</a:t>
+            </a:r>
+          </a:p>
+        </p:txBody>
+      </p:sp>
+    </p:spTree>
+    <p:extLst>
+      <p:ext uri="{BB962C8B-B14F-4D97-AF65-F5344CB8AC3E}">
+        <p14:creationId xmlns:p14="http://schemas.microsoft.com/office/powerpoint/2010/main" val="2609438734"/>
+      </p:ext>
+    </p:extLst>
+  </p:cSld>
+  <p:clrMapOvr>
+    <a:masterClrMapping/>
+  </p:clrMapOvr>
+</p:sld>
+</file>
+
+<file path=ppt/slides/slide20.xml><?xml version="1.0" encoding="utf-8"?>
 <p:sld xmlns:a="http://schemas.openxmlformats.org/drawingml/2006/main" xmlns:r="http://schemas.openxmlformats.org/officeDocument/2006/relationships" xmlns:p="http://schemas.openxmlformats.org/presentationml/2006/main">
   <p:cSld>
     <p:spTree>
@@ -8378,81 +8580,7 @@
 </p:sld>
 </file>
 
-<file path=ppt/slides/slide2.xml><?xml version="1.0" encoding="utf-8"?>
-<p:sld xmlns:a="http://schemas.openxmlformats.org/drawingml/2006/main" xmlns:r="http://schemas.openxmlformats.org/officeDocument/2006/relationships" xmlns:p="http://schemas.openxmlformats.org/presentationml/2006/main">
-  <p:cSld>
-    <p:spTree>
-      <p:nvGrpSpPr>
-        <p:cNvPr id="1" name=""/>
-        <p:cNvGrpSpPr/>
-        <p:nvPr/>
-      </p:nvGrpSpPr>
-      <p:grpSpPr>
-        <a:xfrm>
-          <a:off x="0" y="0"/>
-          <a:ext cx="0" cy="0"/>
-          <a:chOff x="0" y="0"/>
-          <a:chExt cx="0" cy="0"/>
-        </a:xfrm>
-      </p:grpSpPr>
-      <p:sp>
-        <p:nvSpPr>
-          <p:cNvPr id="4" name="Title 3"/>
-          <p:cNvSpPr>
-            <a:spLocks noGrp="1"/>
-          </p:cNvSpPr>
-          <p:nvPr>
-            <p:ph type="title"/>
-          </p:nvPr>
-        </p:nvSpPr>
-        <p:spPr/>
-        <p:txBody>
-          <a:bodyPr/>
-          <a:lstStyle/>
-          <a:p>
-            <a:r>
-              <a:rPr lang="en-US" dirty="0"/>
-              <a:t>overview</a:t>
-            </a:r>
-          </a:p>
-        </p:txBody>
-      </p:sp>
-      <p:sp>
-        <p:nvSpPr>
-          <p:cNvPr id="5" name="Text Placeholder 4"/>
-          <p:cNvSpPr>
-            <a:spLocks noGrp="1"/>
-          </p:cNvSpPr>
-          <p:nvPr>
-            <p:ph type="body" idx="1"/>
-          </p:nvPr>
-        </p:nvSpPr>
-        <p:spPr/>
-        <p:txBody>
-          <a:bodyPr/>
-          <a:lstStyle/>
-          <a:p>
-            <a:r>
-              <a:rPr lang="en-US" dirty="0"/>
-              <a:t>Lesson 1</a:t>
-            </a:r>
-          </a:p>
-        </p:txBody>
-      </p:sp>
-    </p:spTree>
-    <p:extLst>
-      <p:ext uri="{BB962C8B-B14F-4D97-AF65-F5344CB8AC3E}">
-        <p14:creationId xmlns:p14="http://schemas.microsoft.com/office/powerpoint/2010/main" val="2609438734"/>
-      </p:ext>
-    </p:extLst>
-  </p:cSld>
-  <p:clrMapOvr>
-    <a:masterClrMapping/>
-  </p:clrMapOvr>
-</p:sld>
-</file>
-
-<file path=ppt/slides/slide20.xml><?xml version="1.0" encoding="utf-8"?>
+<file path=ppt/slides/slide21.xml><?xml version="1.0" encoding="utf-8"?>
 <p:sld xmlns:a="http://schemas.openxmlformats.org/drawingml/2006/main" xmlns:r="http://schemas.openxmlformats.org/officeDocument/2006/relationships" xmlns:p="http://schemas.openxmlformats.org/presentationml/2006/main">
   <p:cSld>
     <p:spTree>
@@ -8603,7 +8731,7 @@
 </p:sld>
 </file>
 
-<file path=ppt/slides/slide21.xml><?xml version="1.0" encoding="utf-8"?>
+<file path=ppt/slides/slide22.xml><?xml version="1.0" encoding="utf-8"?>
 <p:sld xmlns:a="http://schemas.openxmlformats.org/drawingml/2006/main" xmlns:r="http://schemas.openxmlformats.org/officeDocument/2006/relationships" xmlns:p="http://schemas.openxmlformats.org/presentationml/2006/main">
   <p:cSld>
     <p:spTree>
@@ -8754,7 +8882,7 @@
 </p:sld>
 </file>
 
-<file path=ppt/slides/slide22.xml><?xml version="1.0" encoding="utf-8"?>
+<file path=ppt/slides/slide23.xml><?xml version="1.0" encoding="utf-8"?>
 <p:sld xmlns:a="http://schemas.openxmlformats.org/drawingml/2006/main" xmlns:r="http://schemas.openxmlformats.org/officeDocument/2006/relationships" xmlns:p="http://schemas.openxmlformats.org/presentationml/2006/main">
   <p:cSld>
     <p:spTree>
@@ -8903,7 +9031,7 @@
 </p:sld>
 </file>
 
-<file path=ppt/slides/slide23.xml><?xml version="1.0" encoding="utf-8"?>
+<file path=ppt/slides/slide24.xml><?xml version="1.0" encoding="utf-8"?>
 <p:sld xmlns:a="http://schemas.openxmlformats.org/drawingml/2006/main" xmlns:r="http://schemas.openxmlformats.org/officeDocument/2006/relationships" xmlns:p="http://schemas.openxmlformats.org/presentationml/2006/main">
   <p:cSld>
     <p:spTree>
@@ -9064,7 +9192,7 @@
 </p:sld>
 </file>
 
-<file path=ppt/slides/slide24.xml><?xml version="1.0" encoding="utf-8"?>
+<file path=ppt/slides/slide25.xml><?xml version="1.0" encoding="utf-8"?>
 <p:sld xmlns:a="http://schemas.openxmlformats.org/drawingml/2006/main" xmlns:r="http://schemas.openxmlformats.org/officeDocument/2006/relationships" xmlns:p="http://schemas.openxmlformats.org/presentationml/2006/main">
   <p:cSld>
     <p:spTree>
@@ -9232,7 +9360,7 @@
 </p:sld>
 </file>
 
-<file path=ppt/slides/slide25.xml><?xml version="1.0" encoding="utf-8"?>
+<file path=ppt/slides/slide26.xml><?xml version="1.0" encoding="utf-8"?>
 <p:sld xmlns:a="http://schemas.openxmlformats.org/drawingml/2006/main" xmlns:r="http://schemas.openxmlformats.org/officeDocument/2006/relationships" xmlns:p="http://schemas.openxmlformats.org/presentationml/2006/main">
   <p:cSld>
     <p:spTree>
@@ -9387,7 +9515,7 @@
 </p:sld>
 </file>
 
-<file path=ppt/slides/slide26.xml><?xml version="1.0" encoding="utf-8"?>
+<file path=ppt/slides/slide27.xml><?xml version="1.0" encoding="utf-8"?>
 <p:sld xmlns:a="http://schemas.openxmlformats.org/drawingml/2006/main" xmlns:r="http://schemas.openxmlformats.org/officeDocument/2006/relationships" xmlns:p="http://schemas.openxmlformats.org/presentationml/2006/main">
   <p:cSld>
     <p:spTree>

</xml_diff>